<commit_message>
Final changes before presentation
</commit_message>
<xml_diff>
--- a/Presentation.pptx
+++ b/Presentation.pptx
@@ -4,6 +4,9 @@
   <p:sldMasterIdLst>
     <p:sldMasterId id="2147483769" r:id="rId1"/>
   </p:sldMasterIdLst>
+  <p:notesMasterIdLst>
+    <p:notesMasterId r:id="rId21"/>
+  </p:notesMasterIdLst>
   <p:sldIdLst>
     <p:sldId id="256" r:id="rId2"/>
     <p:sldId id="258" r:id="rId3"/>
@@ -130,6 +133,440 @@
 </p:presentation>
 </file>
 
+<file path=ppt/notesMasters/notesMaster1.xml><?xml version="1.0" encoding="utf-8"?>
+<p:notesMaster xmlns:a="http://schemas.openxmlformats.org/drawingml/2006/main" xmlns:r="http://schemas.openxmlformats.org/officeDocument/2006/relationships" xmlns:p="http://schemas.openxmlformats.org/presentationml/2006/main">
+  <p:cSld>
+    <p:bg>
+      <p:bgRef idx="1001">
+        <a:schemeClr val="bg1"/>
+      </p:bgRef>
+    </p:bg>
+    <p:spTree>
+      <p:nvGrpSpPr>
+        <p:cNvPr id="1" name=""/>
+        <p:cNvGrpSpPr/>
+        <p:nvPr/>
+      </p:nvGrpSpPr>
+      <p:grpSpPr>
+        <a:xfrm>
+          <a:off x="0" y="0"/>
+          <a:ext cx="0" cy="0"/>
+          <a:chOff x="0" y="0"/>
+          <a:chExt cx="0" cy="0"/>
+        </a:xfrm>
+      </p:grpSpPr>
+      <p:sp>
+        <p:nvSpPr>
+          <p:cNvPr id="2" name="Header Placeholder 1"/>
+          <p:cNvSpPr>
+            <a:spLocks noGrp="1"/>
+          </p:cNvSpPr>
+          <p:nvPr>
+            <p:ph type="hdr" sz="quarter"/>
+          </p:nvPr>
+        </p:nvSpPr>
+        <p:spPr>
+          <a:xfrm>
+            <a:off x="0" y="0"/>
+            <a:ext cx="2971800" cy="458788"/>
+          </a:xfrm>
+          <a:prstGeom prst="rect">
+            <a:avLst/>
+          </a:prstGeom>
+        </p:spPr>
+        <p:txBody>
+          <a:bodyPr vert="horz" lIns="91440" tIns="45720" rIns="91440" bIns="45720" rtlCol="0"/>
+          <a:lstStyle>
+            <a:lvl1pPr algn="l">
+              <a:defRPr sz="1200"/>
+            </a:lvl1pPr>
+          </a:lstStyle>
+          <a:p>
+            <a:endParaRPr lang="en-US"/>
+          </a:p>
+        </p:txBody>
+      </p:sp>
+      <p:sp>
+        <p:nvSpPr>
+          <p:cNvPr id="3" name="Date Placeholder 2"/>
+          <p:cNvSpPr>
+            <a:spLocks noGrp="1"/>
+          </p:cNvSpPr>
+          <p:nvPr>
+            <p:ph type="dt" idx="1"/>
+          </p:nvPr>
+        </p:nvSpPr>
+        <p:spPr>
+          <a:xfrm>
+            <a:off x="3884613" y="0"/>
+            <a:ext cx="2971800" cy="458788"/>
+          </a:xfrm>
+          <a:prstGeom prst="rect">
+            <a:avLst/>
+          </a:prstGeom>
+        </p:spPr>
+        <p:txBody>
+          <a:bodyPr vert="horz" lIns="91440" tIns="45720" rIns="91440" bIns="45720" rtlCol="0"/>
+          <a:lstStyle>
+            <a:lvl1pPr algn="r">
+              <a:defRPr sz="1200"/>
+            </a:lvl1pPr>
+          </a:lstStyle>
+          <a:p>
+            <a:fld id="{1409EE53-6AFF-46B4-9B81-084F2522BDE4}" type="datetimeFigureOut">
+              <a:rPr lang="en-US" smtClean="0"/>
+              <a:t>4/14/2015</a:t>
+            </a:fld>
+            <a:endParaRPr lang="en-US"/>
+          </a:p>
+        </p:txBody>
+      </p:sp>
+      <p:sp>
+        <p:nvSpPr>
+          <p:cNvPr id="4" name="Slide Image Placeholder 3"/>
+          <p:cNvSpPr>
+            <a:spLocks noGrp="1" noRot="1" noChangeAspect="1"/>
+          </p:cNvSpPr>
+          <p:nvPr>
+            <p:ph type="sldImg" idx="2"/>
+          </p:nvPr>
+        </p:nvSpPr>
+        <p:spPr>
+          <a:xfrm>
+            <a:off x="685800" y="1143000"/>
+            <a:ext cx="5486400" cy="3086100"/>
+          </a:xfrm>
+          <a:prstGeom prst="rect">
+            <a:avLst/>
+          </a:prstGeom>
+          <a:noFill/>
+          <a:ln w="12700">
+            <a:solidFill>
+              <a:prstClr val="black"/>
+            </a:solidFill>
+          </a:ln>
+        </p:spPr>
+        <p:txBody>
+          <a:bodyPr vert="horz" lIns="91440" tIns="45720" rIns="91440" bIns="45720" rtlCol="0" anchor="ctr"/>
+          <a:lstStyle/>
+          <a:p>
+            <a:endParaRPr lang="en-US"/>
+          </a:p>
+        </p:txBody>
+      </p:sp>
+      <p:sp>
+        <p:nvSpPr>
+          <p:cNvPr id="5" name="Notes Placeholder 4"/>
+          <p:cNvSpPr>
+            <a:spLocks noGrp="1"/>
+          </p:cNvSpPr>
+          <p:nvPr>
+            <p:ph type="body" sz="quarter" idx="3"/>
+          </p:nvPr>
+        </p:nvSpPr>
+        <p:spPr>
+          <a:xfrm>
+            <a:off x="685800" y="4400550"/>
+            <a:ext cx="5486400" cy="3600450"/>
+          </a:xfrm>
+          <a:prstGeom prst="rect">
+            <a:avLst/>
+          </a:prstGeom>
+        </p:spPr>
+        <p:txBody>
+          <a:bodyPr vert="horz" lIns="91440" tIns="45720" rIns="91440" bIns="45720" rtlCol="0"/>
+          <a:lstStyle/>
+          <a:p>
+            <a:pPr lvl="0"/>
+            <a:r>
+              <a:rPr lang="en-US" smtClean="0"/>
+              <a:t>Click to edit Master text styles</a:t>
+            </a:r>
+          </a:p>
+          <a:p>
+            <a:pPr lvl="1"/>
+            <a:r>
+              <a:rPr lang="en-US" smtClean="0"/>
+              <a:t>Second level</a:t>
+            </a:r>
+          </a:p>
+          <a:p>
+            <a:pPr lvl="2"/>
+            <a:r>
+              <a:rPr lang="en-US" smtClean="0"/>
+              <a:t>Third level</a:t>
+            </a:r>
+          </a:p>
+          <a:p>
+            <a:pPr lvl="3"/>
+            <a:r>
+              <a:rPr lang="en-US" smtClean="0"/>
+              <a:t>Fourth level</a:t>
+            </a:r>
+          </a:p>
+          <a:p>
+            <a:pPr lvl="4"/>
+            <a:r>
+              <a:rPr lang="en-US" smtClean="0"/>
+              <a:t>Fifth level</a:t>
+            </a:r>
+            <a:endParaRPr lang="en-US"/>
+          </a:p>
+        </p:txBody>
+      </p:sp>
+      <p:sp>
+        <p:nvSpPr>
+          <p:cNvPr id="6" name="Footer Placeholder 5"/>
+          <p:cNvSpPr>
+            <a:spLocks noGrp="1"/>
+          </p:cNvSpPr>
+          <p:nvPr>
+            <p:ph type="ftr" sz="quarter" idx="4"/>
+          </p:nvPr>
+        </p:nvSpPr>
+        <p:spPr>
+          <a:xfrm>
+            <a:off x="0" y="8685213"/>
+            <a:ext cx="2971800" cy="458787"/>
+          </a:xfrm>
+          <a:prstGeom prst="rect">
+            <a:avLst/>
+          </a:prstGeom>
+        </p:spPr>
+        <p:txBody>
+          <a:bodyPr vert="horz" lIns="91440" tIns="45720" rIns="91440" bIns="45720" rtlCol="0" anchor="b"/>
+          <a:lstStyle>
+            <a:lvl1pPr algn="l">
+              <a:defRPr sz="1200"/>
+            </a:lvl1pPr>
+          </a:lstStyle>
+          <a:p>
+            <a:endParaRPr lang="en-US"/>
+          </a:p>
+        </p:txBody>
+      </p:sp>
+      <p:sp>
+        <p:nvSpPr>
+          <p:cNvPr id="7" name="Slide Number Placeholder 6"/>
+          <p:cNvSpPr>
+            <a:spLocks noGrp="1"/>
+          </p:cNvSpPr>
+          <p:nvPr>
+            <p:ph type="sldNum" sz="quarter" idx="5"/>
+          </p:nvPr>
+        </p:nvSpPr>
+        <p:spPr>
+          <a:xfrm>
+            <a:off x="3884613" y="8685213"/>
+            <a:ext cx="2971800" cy="458787"/>
+          </a:xfrm>
+          <a:prstGeom prst="rect">
+            <a:avLst/>
+          </a:prstGeom>
+        </p:spPr>
+        <p:txBody>
+          <a:bodyPr vert="horz" lIns="91440" tIns="45720" rIns="91440" bIns="45720" rtlCol="0" anchor="b"/>
+          <a:lstStyle>
+            <a:lvl1pPr algn="r">
+              <a:defRPr sz="1200"/>
+            </a:lvl1pPr>
+          </a:lstStyle>
+          <a:p>
+            <a:fld id="{AC16F83E-C6D5-4018-9759-041796772ED7}" type="slidenum">
+              <a:rPr lang="en-US" smtClean="0"/>
+              <a:t>‹#›</a:t>
+            </a:fld>
+            <a:endParaRPr lang="en-US"/>
+          </a:p>
+        </p:txBody>
+      </p:sp>
+    </p:spTree>
+    <p:extLst>
+      <p:ext uri="{BB962C8B-B14F-4D97-AF65-F5344CB8AC3E}">
+        <p14:creationId xmlns:p14="http://schemas.microsoft.com/office/powerpoint/2010/main" val="2515416773"/>
+      </p:ext>
+    </p:extLst>
+  </p:cSld>
+  <p:clrMap bg1="lt1" tx1="dk1" bg2="lt2" tx2="dk2" accent1="accent1" accent2="accent2" accent3="accent3" accent4="accent4" accent5="accent5" accent6="accent6" hlink="hlink" folHlink="folHlink"/>
+  <p:notesStyle>
+    <a:lvl1pPr marL="0" algn="l" defTabSz="914400" rtl="0" eaLnBrk="1" latinLnBrk="0" hangingPunct="1">
+      <a:defRPr sz="1200" kern="1200">
+        <a:solidFill>
+          <a:schemeClr val="tx1"/>
+        </a:solidFill>
+        <a:latin typeface="+mn-lt"/>
+        <a:ea typeface="+mn-ea"/>
+        <a:cs typeface="+mn-cs"/>
+      </a:defRPr>
+    </a:lvl1pPr>
+    <a:lvl2pPr marL="457200" algn="l" defTabSz="914400" rtl="0" eaLnBrk="1" latinLnBrk="0" hangingPunct="1">
+      <a:defRPr sz="1200" kern="1200">
+        <a:solidFill>
+          <a:schemeClr val="tx1"/>
+        </a:solidFill>
+        <a:latin typeface="+mn-lt"/>
+        <a:ea typeface="+mn-ea"/>
+        <a:cs typeface="+mn-cs"/>
+      </a:defRPr>
+    </a:lvl2pPr>
+    <a:lvl3pPr marL="914400" algn="l" defTabSz="914400" rtl="0" eaLnBrk="1" latinLnBrk="0" hangingPunct="1">
+      <a:defRPr sz="1200" kern="1200">
+        <a:solidFill>
+          <a:schemeClr val="tx1"/>
+        </a:solidFill>
+        <a:latin typeface="+mn-lt"/>
+        <a:ea typeface="+mn-ea"/>
+        <a:cs typeface="+mn-cs"/>
+      </a:defRPr>
+    </a:lvl3pPr>
+    <a:lvl4pPr marL="1371600" algn="l" defTabSz="914400" rtl="0" eaLnBrk="1" latinLnBrk="0" hangingPunct="1">
+      <a:defRPr sz="1200" kern="1200">
+        <a:solidFill>
+          <a:schemeClr val="tx1"/>
+        </a:solidFill>
+        <a:latin typeface="+mn-lt"/>
+        <a:ea typeface="+mn-ea"/>
+        <a:cs typeface="+mn-cs"/>
+      </a:defRPr>
+    </a:lvl4pPr>
+    <a:lvl5pPr marL="1828800" algn="l" defTabSz="914400" rtl="0" eaLnBrk="1" latinLnBrk="0" hangingPunct="1">
+      <a:defRPr sz="1200" kern="1200">
+        <a:solidFill>
+          <a:schemeClr val="tx1"/>
+        </a:solidFill>
+        <a:latin typeface="+mn-lt"/>
+        <a:ea typeface="+mn-ea"/>
+        <a:cs typeface="+mn-cs"/>
+      </a:defRPr>
+    </a:lvl5pPr>
+    <a:lvl6pPr marL="2286000" algn="l" defTabSz="914400" rtl="0" eaLnBrk="1" latinLnBrk="0" hangingPunct="1">
+      <a:defRPr sz="1200" kern="1200">
+        <a:solidFill>
+          <a:schemeClr val="tx1"/>
+        </a:solidFill>
+        <a:latin typeface="+mn-lt"/>
+        <a:ea typeface="+mn-ea"/>
+        <a:cs typeface="+mn-cs"/>
+      </a:defRPr>
+    </a:lvl6pPr>
+    <a:lvl7pPr marL="2743200" algn="l" defTabSz="914400" rtl="0" eaLnBrk="1" latinLnBrk="0" hangingPunct="1">
+      <a:defRPr sz="1200" kern="1200">
+        <a:solidFill>
+          <a:schemeClr val="tx1"/>
+        </a:solidFill>
+        <a:latin typeface="+mn-lt"/>
+        <a:ea typeface="+mn-ea"/>
+        <a:cs typeface="+mn-cs"/>
+      </a:defRPr>
+    </a:lvl7pPr>
+    <a:lvl8pPr marL="3200400" algn="l" defTabSz="914400" rtl="0" eaLnBrk="1" latinLnBrk="0" hangingPunct="1">
+      <a:defRPr sz="1200" kern="1200">
+        <a:solidFill>
+          <a:schemeClr val="tx1"/>
+        </a:solidFill>
+        <a:latin typeface="+mn-lt"/>
+        <a:ea typeface="+mn-ea"/>
+        <a:cs typeface="+mn-cs"/>
+      </a:defRPr>
+    </a:lvl8pPr>
+    <a:lvl9pPr marL="3657600" algn="l" defTabSz="914400" rtl="0" eaLnBrk="1" latinLnBrk="0" hangingPunct="1">
+      <a:defRPr sz="1200" kern="1200">
+        <a:solidFill>
+          <a:schemeClr val="tx1"/>
+        </a:solidFill>
+        <a:latin typeface="+mn-lt"/>
+        <a:ea typeface="+mn-ea"/>
+        <a:cs typeface="+mn-cs"/>
+      </a:defRPr>
+    </a:lvl9pPr>
+  </p:notesStyle>
+</p:notesMaster>
+</file>
+
+<file path=ppt/notesSlides/notesSlide1.xml><?xml version="1.0" encoding="utf-8"?>
+<p:notes xmlns:a="http://schemas.openxmlformats.org/drawingml/2006/main" xmlns:r="http://schemas.openxmlformats.org/officeDocument/2006/relationships" xmlns:p="http://schemas.openxmlformats.org/presentationml/2006/main">
+  <p:cSld>
+    <p:spTree>
+      <p:nvGrpSpPr>
+        <p:cNvPr id="1" name=""/>
+        <p:cNvGrpSpPr/>
+        <p:nvPr/>
+      </p:nvGrpSpPr>
+      <p:grpSpPr>
+        <a:xfrm>
+          <a:off x="0" y="0"/>
+          <a:ext cx="0" cy="0"/>
+          <a:chOff x="0" y="0"/>
+          <a:chExt cx="0" cy="0"/>
+        </a:xfrm>
+      </p:grpSpPr>
+      <p:sp>
+        <p:nvSpPr>
+          <p:cNvPr id="2" name="Slide Image Placeholder 1"/>
+          <p:cNvSpPr>
+            <a:spLocks noGrp="1" noRot="1" noChangeAspect="1"/>
+          </p:cNvSpPr>
+          <p:nvPr>
+            <p:ph type="sldImg"/>
+          </p:nvPr>
+        </p:nvSpPr>
+        <p:spPr/>
+      </p:sp>
+      <p:sp>
+        <p:nvSpPr>
+          <p:cNvPr id="3" name="Notes Placeholder 2"/>
+          <p:cNvSpPr>
+            <a:spLocks noGrp="1"/>
+          </p:cNvSpPr>
+          <p:nvPr>
+            <p:ph type="body" idx="1"/>
+          </p:nvPr>
+        </p:nvSpPr>
+        <p:spPr/>
+        <p:txBody>
+          <a:bodyPr/>
+          <a:lstStyle/>
+          <a:p>
+            <a:endParaRPr lang="en-US" dirty="0"/>
+          </a:p>
+        </p:txBody>
+      </p:sp>
+      <p:sp>
+        <p:nvSpPr>
+          <p:cNvPr id="4" name="Slide Number Placeholder 3"/>
+          <p:cNvSpPr>
+            <a:spLocks noGrp="1"/>
+          </p:cNvSpPr>
+          <p:nvPr>
+            <p:ph type="sldNum" sz="quarter" idx="10"/>
+          </p:nvPr>
+        </p:nvSpPr>
+        <p:spPr/>
+        <p:txBody>
+          <a:bodyPr/>
+          <a:lstStyle/>
+          <a:p>
+            <a:fld id="{AC16F83E-C6D5-4018-9759-041796772ED7}" type="slidenum">
+              <a:rPr lang="en-US" smtClean="0"/>
+              <a:t>18</a:t>
+            </a:fld>
+            <a:endParaRPr lang="en-US"/>
+          </a:p>
+        </p:txBody>
+      </p:sp>
+    </p:spTree>
+    <p:extLst>
+      <p:ext uri="{BB962C8B-B14F-4D97-AF65-F5344CB8AC3E}">
+        <p14:creationId xmlns:p14="http://schemas.microsoft.com/office/powerpoint/2010/main" val="3513983335"/>
+      </p:ext>
+    </p:extLst>
+  </p:cSld>
+  <p:clrMapOvr>
+    <a:masterClrMapping/>
+  </p:clrMapOvr>
+</p:notes>
+</file>
+
 <file path=ppt/slideLayouts/slideLayout1.xml><?xml version="1.0" encoding="utf-8"?>
 <p:sldLayout xmlns:a="http://schemas.openxmlformats.org/drawingml/2006/main" xmlns:r="http://schemas.openxmlformats.org/officeDocument/2006/relationships" xmlns:p="http://schemas.openxmlformats.org/presentationml/2006/main" showMasterSp="0" type="title" preserve="1">
   <p:cSld name="Title Slide">
@@ -356,7 +793,7 @@
           <a:p>
             <a:fld id="{96DFF08F-DC6B-4601-B491-B0F83F6DD2DA}" type="datetimeFigureOut">
               <a:rPr lang="en-US" smtClean="0"/>
-              <a:t>4/9/2015</a:t>
+              <a:t>4/14/2015</a:t>
             </a:fld>
             <a:endParaRPr lang="en-US" dirty="0"/>
           </a:p>
@@ -564,7 +1001,7 @@
           <a:p>
             <a:fld id="{96DFF08F-DC6B-4601-B491-B0F83F6DD2DA}" type="datetimeFigureOut">
               <a:rPr lang="en-US" smtClean="0"/>
-              <a:t>4/9/2015</a:t>
+              <a:t>4/14/2015</a:t>
             </a:fld>
             <a:endParaRPr lang="en-US" dirty="0"/>
           </a:p>
@@ -820,7 +1257,7 @@
           <a:p>
             <a:fld id="{96DFF08F-DC6B-4601-B491-B0F83F6DD2DA}" type="datetimeFigureOut">
               <a:rPr lang="en-US" smtClean="0"/>
-              <a:t>4/9/2015</a:t>
+              <a:t>4/14/2015</a:t>
             </a:fld>
             <a:endParaRPr lang="en-US" dirty="0"/>
           </a:p>
@@ -990,7 +1427,7 @@
           <a:p>
             <a:fld id="{D62CEF3B-A037-46D0-B02C-1428F07E9383}" type="datetimeFigureOut">
               <a:rPr lang="en-US" smtClean="0"/>
-              <a:t>4/9/2015</a:t>
+              <a:t>4/14/2015</a:t>
             </a:fld>
             <a:endParaRPr lang="en-US" dirty="0"/>
           </a:p>
@@ -1333,7 +1770,7 @@
           <a:p>
             <a:fld id="{96DFF08F-DC6B-4601-B491-B0F83F6DD2DA}" type="datetimeFigureOut">
               <a:rPr lang="en-US" smtClean="0"/>
-              <a:t>4/9/2015</a:t>
+              <a:t>4/14/2015</a:t>
             </a:fld>
             <a:endParaRPr lang="en-US" dirty="0"/>
           </a:p>
@@ -1608,7 +2045,7 @@
           <a:p>
             <a:fld id="{96DFF08F-DC6B-4601-B491-B0F83F6DD2DA}" type="datetimeFigureOut">
               <a:rPr lang="en-US" smtClean="0"/>
-              <a:t>4/9/2015</a:t>
+              <a:t>4/14/2015</a:t>
             </a:fld>
             <a:endParaRPr lang="en-US" dirty="0"/>
           </a:p>
@@ -1987,7 +2424,7 @@
           <a:p>
             <a:fld id="{96DFF08F-DC6B-4601-B491-B0F83F6DD2DA}" type="datetimeFigureOut">
               <a:rPr lang="en-US" smtClean="0"/>
-              <a:t>4/9/2015</a:t>
+              <a:t>4/14/2015</a:t>
             </a:fld>
             <a:endParaRPr lang="en-US" dirty="0"/>
           </a:p>
@@ -2105,7 +2542,7 @@
           <a:p>
             <a:fld id="{96DFF08F-DC6B-4601-B491-B0F83F6DD2DA}" type="datetimeFigureOut">
               <a:rPr lang="en-US" smtClean="0"/>
-              <a:t>4/9/2015</a:t>
+              <a:t>4/14/2015</a:t>
             </a:fld>
             <a:endParaRPr lang="en-US" dirty="0"/>
           </a:p>
@@ -2277,7 +2714,7 @@
             <a:fld id="{96DFF08F-DC6B-4601-B491-B0F83F6DD2DA}" type="datetimeFigureOut">
               <a:rPr lang="en-US" smtClean="0"/>
               <a:pPr/>
-              <a:t>4/9/2015</a:t>
+              <a:t>4/14/2015</a:t>
             </a:fld>
             <a:endParaRPr lang="en-US" dirty="0"/>
           </a:p>
@@ -2633,7 +3070,7 @@
             <a:fld id="{96DFF08F-DC6B-4601-B491-B0F83F6DD2DA}" type="datetimeFigureOut">
               <a:rPr lang="en-US" smtClean="0"/>
               <a:pPr/>
-              <a:t>4/9/2015</a:t>
+              <a:t>4/14/2015</a:t>
             </a:fld>
             <a:endParaRPr lang="en-US" dirty="0"/>
           </a:p>
@@ -3011,7 +3448,7 @@
           <a:p>
             <a:fld id="{96DFF08F-DC6B-4601-B491-B0F83F6DD2DA}" type="datetimeFigureOut">
               <a:rPr lang="en-US" smtClean="0"/>
-              <a:t>4/9/2015</a:t>
+              <a:t>4/14/2015</a:t>
             </a:fld>
             <a:endParaRPr lang="en-US" dirty="0"/>
           </a:p>
@@ -3299,7 +3736,7 @@
             <a:fld id="{96DFF08F-DC6B-4601-B491-B0F83F6DD2DA}" type="datetimeFigureOut">
               <a:rPr lang="en-US" smtClean="0"/>
               <a:pPr/>
-              <a:t>4/9/2015</a:t>
+              <a:t>4/14/2015</a:t>
             </a:fld>
             <a:endParaRPr lang="en-US" dirty="0"/>
           </a:p>
@@ -4666,8 +5103,8 @@
         </p:blipFill>
         <p:spPr>
           <a:xfrm>
-            <a:off x="7832275" y="1845734"/>
-            <a:ext cx="3323405" cy="4331694"/>
+            <a:off x="7832274" y="642551"/>
+            <a:ext cx="4246523" cy="5534877"/>
           </a:xfrm>
           <a:prstGeom prst="rect">
             <a:avLst/>
@@ -4728,14 +5165,16 @@
         </p:nvSpPr>
         <p:spPr/>
         <p:txBody>
-          <a:bodyPr/>
-          <a:lstStyle/>
-          <a:p>
-            <a:r>
-              <a:rPr lang="en-US" dirty="0" smtClean="0"/>
+          <a:bodyPr>
+            <a:normAutofit/>
+          </a:bodyPr>
+          <a:lstStyle/>
+          <a:p>
+            <a:r>
+              <a:rPr lang="en-US" sz="2800" dirty="0" smtClean="0"/>
               <a:t>ChemicalStructureIndexer.cs</a:t>
             </a:r>
-            <a:endParaRPr lang="en-US" dirty="0"/>
+            <a:endParaRPr lang="en-US" sz="2800" dirty="0"/>
           </a:p>
         </p:txBody>
       </p:sp>
@@ -4836,8 +5275,8 @@
         </p:blipFill>
         <p:spPr>
           <a:xfrm>
-            <a:off x="5544452" y="1922465"/>
-            <a:ext cx="5611228" cy="4268728"/>
+            <a:off x="5155411" y="930876"/>
+            <a:ext cx="6914669" cy="5260317"/>
           </a:xfrm>
           <a:prstGeom prst="rect">
             <a:avLst/>
@@ -4989,14 +5428,16 @@
         </p:nvSpPr>
         <p:spPr/>
         <p:txBody>
-          <a:bodyPr/>
-          <a:lstStyle/>
-          <a:p>
-            <a:r>
-              <a:rPr lang="en-US" dirty="0" smtClean="0"/>
+          <a:bodyPr>
+            <a:normAutofit/>
+          </a:bodyPr>
+          <a:lstStyle/>
+          <a:p>
+            <a:r>
+              <a:rPr lang="en-US" sz="3200" dirty="0" smtClean="0"/>
               <a:t>ChemicalStructureSearcher.cs</a:t>
             </a:r>
-            <a:endParaRPr lang="en-US" dirty="0"/>
+            <a:endParaRPr lang="en-US" sz="3200" dirty="0"/>
           </a:p>
         </p:txBody>
       </p:sp>
@@ -5137,8 +5578,8 @@
         </p:blipFill>
         <p:spPr>
           <a:xfrm>
-            <a:off x="6611815" y="1845734"/>
-            <a:ext cx="4543865" cy="4386014"/>
+            <a:off x="6203092" y="562860"/>
+            <a:ext cx="5868013" cy="5664162"/>
           </a:xfrm>
           <a:prstGeom prst="rect">
             <a:avLst/>
@@ -5221,7 +5662,7 @@
           </p:nvPr>
         </p:nvPicPr>
         <p:blipFill>
-          <a:blip r:embed="rId2"/>
+          <a:blip r:embed="rId3"/>
           <a:stretch>
             <a:fillRect/>
           </a:stretch>
@@ -5290,7 +5731,7 @@
           <a:p>
             <a:r>
               <a:rPr lang="en-US" dirty="0" smtClean="0"/>
-              <a:t>Questions – AMA!</a:t>
+              <a:t>Summary</a:t>
             </a:r>
             <a:endParaRPr lang="en-US" dirty="0"/>
           </a:p>
@@ -5311,12 +5752,48 @@
           <a:bodyPr/>
           <a:lstStyle/>
           <a:p>
+            <a:r>
+              <a:rPr lang="en-US" dirty="0" smtClean="0"/>
+              <a:t>Chemical structure searching is no longer requires expensive/proprietary solutions</a:t>
+            </a:r>
+          </a:p>
+          <a:p>
+            <a:r>
+              <a:rPr lang="en-US" dirty="0" smtClean="0"/>
+              <a:t>Chemical structure searching can be implemented easily using open-source technologies</a:t>
+            </a:r>
+          </a:p>
+          <a:p>
+            <a:pPr lvl="1"/>
+            <a:r>
+              <a:rPr lang="en-US" dirty="0" err="1" smtClean="0"/>
+              <a:t>Lucene.Net</a:t>
+            </a:r>
+            <a:r>
+              <a:rPr lang="en-US" dirty="0" smtClean="0"/>
+              <a:t> and Indigo</a:t>
+            </a:r>
             <a:endParaRPr lang="en-US" dirty="0" smtClean="0"/>
           </a:p>
           <a:p>
+            <a:pPr lvl="1"/>
+            <a:r>
+              <a:rPr lang="en-US" dirty="0" smtClean="0"/>
+              <a:t>Superior performance compared to database-based implementations</a:t>
+            </a:r>
+            <a:endParaRPr lang="en-US" dirty="0" smtClean="0"/>
+          </a:p>
+          <a:p>
+            <a:endParaRPr lang="en-US" dirty="0" smtClean="0"/>
+          </a:p>
+          <a:p>
+            <a:r>
+              <a:rPr lang="en-US" dirty="0" smtClean="0"/>
+              <a:t>A </a:t>
+            </a:r>
             <a:r>
               <a:rPr lang="en-US" dirty="0"/>
-              <a:t>A copy of this presentation and all demo code is available on GitHub:</a:t>
+              <a:t>copy of this presentation and all demo code is available on GitHub:</a:t>
             </a:r>
           </a:p>
           <a:p>
@@ -5329,6 +5806,17 @@
             <a:endParaRPr lang="en-US" dirty="0"/>
           </a:p>
           <a:p>
+            <a:endParaRPr lang="en-US" dirty="0" smtClean="0"/>
+          </a:p>
+          <a:p>
+            <a:r>
+              <a:rPr lang="en-US" dirty="0"/>
+              <a:t>Questions</a:t>
+            </a:r>
+            <a:r>
+              <a:rPr lang="en-US" dirty="0" smtClean="0"/>
+              <a:t>?</a:t>
+            </a:r>
             <a:endParaRPr lang="en-US" dirty="0"/>
           </a:p>
         </p:txBody>
@@ -5566,21 +6054,49 @@
             <a:pPr lvl="1"/>
             <a:r>
               <a:rPr lang="en-US" dirty="0"/>
-              <a:t>Built Electronic Laboratory Notebooks (ELNs) for the pharmaceutical industry</a:t>
+              <a:t>Built </a:t>
+            </a:r>
+            <a:r>
+              <a:rPr lang="en-US" dirty="0" smtClean="0"/>
+              <a:t>information management solutions for </a:t>
+            </a:r>
+            <a:r>
+              <a:rPr lang="en-US" dirty="0"/>
+              <a:t>the pharmaceutical industry</a:t>
             </a:r>
           </a:p>
           <a:p>
             <a:pPr lvl="1"/>
             <a:r>
+              <a:rPr lang="en-US" dirty="0" smtClean="0"/>
+              <a:t>Created an Electronic </a:t>
+            </a:r>
+            <a:r>
               <a:rPr lang="en-US" dirty="0"/>
-              <a:t>Replaced paper notebooks</a:t>
+              <a:t>Laboratory </a:t>
+            </a:r>
+            <a:r>
+              <a:rPr lang="en-US" dirty="0" smtClean="0"/>
+              <a:t>Notebook that replaced </a:t>
+            </a:r>
+            <a:r>
+              <a:rPr lang="en-US" dirty="0"/>
+              <a:t>paper notebooks</a:t>
             </a:r>
           </a:p>
           <a:p>
             <a:pPr lvl="1"/>
             <a:r>
               <a:rPr lang="en-US" dirty="0"/>
-              <a:t>Recorded chemical procedures (“recipes”) as structure data</a:t>
+              <a:t>Recorded chemical procedures (“recipes”) as </a:t>
+            </a:r>
+            <a:r>
+              <a:rPr lang="en-US" dirty="0" smtClean="0"/>
+              <a:t>structured </a:t>
+            </a:r>
+            <a:r>
+              <a:rPr lang="en-US" dirty="0"/>
+              <a:t>data</a:t>
             </a:r>
           </a:p>
           <a:p>
@@ -5697,8 +6213,24 @@
           <a:p>
             <a:r>
               <a:rPr lang="en-US" sz="1800" dirty="0" smtClean="0"/>
-              <a:t>Representation of the atoms and bonds that comprise a molecule</a:t>
-            </a:r>
+              <a:t>Representation of the atoms and bonds that comprise a </a:t>
+            </a:r>
+            <a:r>
+              <a:rPr lang="en-US" sz="1800" dirty="0" smtClean="0"/>
+              <a:t>molecule</a:t>
+            </a:r>
+          </a:p>
+          <a:p>
+            <a:pPr lvl="1"/>
+            <a:r>
+              <a:rPr lang="en-US" sz="1600" dirty="0"/>
+              <a:t>Coordinates table (visual layout of atoms</a:t>
+            </a:r>
+            <a:r>
+              <a:rPr lang="en-US" sz="1600" dirty="0" smtClean="0"/>
+              <a:t>)</a:t>
+            </a:r>
+            <a:endParaRPr lang="en-US" sz="1600" dirty="0" smtClean="0"/>
           </a:p>
           <a:p>
             <a:pPr lvl="1"/>
@@ -5708,16 +6240,13 @@
             </a:r>
           </a:p>
           <a:p>
-            <a:pPr lvl="1"/>
-            <a:r>
-              <a:rPr lang="en-US" sz="1600" dirty="0" smtClean="0"/>
-              <a:t>Coordinates table (visual layout of atoms)</a:t>
-            </a:r>
-          </a:p>
-          <a:p>
             <a:r>
               <a:rPr lang="en-US" sz="1800" dirty="0" smtClean="0"/>
-              <a:t>Visually represented as a two-dimensional diagram:</a:t>
+              <a:t>Visually </a:t>
+            </a:r>
+            <a:r>
+              <a:rPr lang="en-US" sz="1800" dirty="0" smtClean="0"/>
+              <a:t>represented as a two-dimensional diagram:</a:t>
             </a:r>
             <a:endParaRPr lang="en-US" sz="1800" dirty="0"/>
           </a:p>
@@ -6202,7 +6731,9 @@
         </p:nvSpPr>
         <p:spPr/>
         <p:txBody>
-          <a:bodyPr/>
+          <a:bodyPr>
+            <a:normAutofit lnSpcReduction="10000"/>
+          </a:bodyPr>
           <a:lstStyle/>
           <a:p>
             <a:r>
@@ -6234,15 +6765,39 @@
             <a:pPr lvl="2"/>
             <a:r>
               <a:rPr lang="en-US" dirty="0" smtClean="0"/>
-              <a:t>Database plug-in (“data cartridge”) performed searching</a:t>
-            </a:r>
+              <a:t>Database plug-in (“data cartridge”) performed </a:t>
+            </a:r>
+            <a:r>
+              <a:rPr lang="en-US" dirty="0" smtClean="0"/>
+              <a:t>searching</a:t>
+            </a:r>
+          </a:p>
+          <a:p>
+            <a:pPr lvl="2"/>
+            <a:r>
+              <a:rPr lang="en-US" dirty="0" smtClean="0"/>
+              <a:t>Mediocre performance</a:t>
+            </a:r>
+            <a:endParaRPr lang="en-US" dirty="0" smtClean="0"/>
           </a:p>
           <a:p>
             <a:pPr lvl="1"/>
             <a:r>
               <a:rPr lang="en-US" dirty="0" smtClean="0"/>
-              <a:t>Unix server implementation (Daylight)</a:t>
-            </a:r>
+              <a:t>Unix server implementation (Daylight</a:t>
+            </a:r>
+            <a:r>
+              <a:rPr lang="en-US" dirty="0" smtClean="0"/>
+              <a:t>)</a:t>
+            </a:r>
+          </a:p>
+          <a:p>
+            <a:pPr lvl="2"/>
+            <a:r>
+              <a:rPr lang="en-US" dirty="0" smtClean="0"/>
+              <a:t>Better performance</a:t>
+            </a:r>
+            <a:endParaRPr lang="en-US" dirty="0" smtClean="0"/>
           </a:p>
           <a:p>
             <a:pPr lvl="2"/>
@@ -6559,24 +7114,36 @@
           <a:p>
             <a:r>
               <a:rPr lang="en-US" dirty="0" smtClean="0"/>
-              <a:t>Leverage Lucene to perform searching and indexing:</a:t>
-            </a:r>
-          </a:p>
-          <a:p>
-            <a:pPr lvl="1"/>
-            <a:r>
-              <a:rPr lang="en-US" dirty="0" smtClean="0"/>
-              <a:t>Lucene employs an inverted index to achieve superior performance</a:t>
-            </a:r>
-          </a:p>
-          <a:p>
-            <a:pPr lvl="1"/>
-            <a:r>
-              <a:rPr lang="en-US" smtClean="0"/>
+              <a:t>Leverage </a:t>
+            </a:r>
+            <a:r>
+              <a:rPr lang="en-US" dirty="0" smtClean="0">
+                <a:solidFill>
+                  <a:schemeClr val="accent2"/>
+                </a:solidFill>
+              </a:rPr>
               <a:t>Lucene</a:t>
             </a:r>
             <a:r>
               <a:rPr lang="en-US" dirty="0" smtClean="0"/>
+              <a:t> to perform </a:t>
+            </a:r>
+            <a:r>
+              <a:rPr lang="en-US" dirty="0" smtClean="0"/>
+              <a:t>indexing and searching</a:t>
+            </a:r>
+          </a:p>
+          <a:p>
+            <a:r>
+              <a:rPr lang="en-US" dirty="0" smtClean="0"/>
+              <a:t>But…</a:t>
+            </a:r>
+            <a:r>
+              <a:rPr lang="en-US" dirty="0" err="1" smtClean="0"/>
+              <a:t>Lucene</a:t>
+            </a:r>
+            <a:r>
+              <a:rPr lang="en-US" dirty="0" smtClean="0"/>
               <a:t> </a:t>
             </a:r>
             <a:r>
@@ -6587,8 +7154,37 @@
           <a:p>
             <a:r>
               <a:rPr lang="en-US" dirty="0" smtClean="0"/>
-              <a:t>Must convert the properties of chemical structures into text-based representations which can then be indexed and searched using Lucene</a:t>
-            </a:r>
+              <a:t>So…must </a:t>
+            </a:r>
+            <a:r>
+              <a:rPr lang="en-US" dirty="0" smtClean="0"/>
+              <a:t>convert the properties of chemical structures into text-based representations which can then be indexed and searched using </a:t>
+            </a:r>
+            <a:r>
+              <a:rPr lang="en-US" dirty="0" err="1" smtClean="0"/>
+              <a:t>Lucene</a:t>
+            </a:r>
+            <a:r>
+              <a:rPr lang="en-US" dirty="0"/>
+              <a:t> </a:t>
+            </a:r>
+            <a:r>
+              <a:rPr lang="en-US" dirty="0" smtClean="0"/>
+              <a:t>=&gt; </a:t>
+            </a:r>
+            <a:r>
+              <a:rPr lang="en-US" dirty="0" smtClean="0">
+                <a:solidFill>
+                  <a:schemeClr val="accent2"/>
+                </a:solidFill>
+              </a:rPr>
+              <a:t>Indigo</a:t>
+            </a:r>
+            <a:endParaRPr lang="en-US" dirty="0" smtClean="0">
+              <a:solidFill>
+                <a:schemeClr val="accent2"/>
+              </a:solidFill>
+            </a:endParaRPr>
           </a:p>
         </p:txBody>
       </p:sp>
@@ -6723,7 +7319,23 @@
             <a:pPr lvl="2"/>
             <a:r>
               <a:rPr lang="en-US" sz="1200" dirty="0" smtClean="0"/>
-              <a:t>Tokens: The, quick, brown, fox, jumps, over, the, lazy, dog</a:t>
+              <a:t>Tokens: </a:t>
+            </a:r>
+            <a:r>
+              <a:rPr lang="en-US" sz="1200" dirty="0" smtClean="0"/>
+              <a:t>the</a:t>
+            </a:r>
+            <a:r>
+              <a:rPr lang="en-US" sz="1200" dirty="0" smtClean="0"/>
+              <a:t>, quick, brown, fox, jumps, </a:t>
+            </a:r>
+            <a:r>
+              <a:rPr lang="en-US" sz="1200" dirty="0" smtClean="0"/>
+              <a:t>over, </a:t>
+            </a:r>
+            <a:r>
+              <a:rPr lang="en-US" sz="1200" dirty="0" smtClean="0"/>
+              <a:t>lazy, dog</a:t>
             </a:r>
             <a:endParaRPr lang="en-US" sz="1200" dirty="0"/>
           </a:p>
@@ -6810,15 +7422,7 @@
           <a:p>
             <a:pPr lvl="1"/>
             <a:r>
-              <a:rPr lang="en-US" sz="1600" dirty="0" smtClean="0"/>
-              <a:t>Fixed list of possible features</a:t>
-            </a:r>
-            <a:endParaRPr lang="en-US" sz="1600" dirty="0"/>
-          </a:p>
-          <a:p>
-            <a:pPr lvl="1"/>
-            <a:r>
-              <a:rPr lang="en-US" sz="1600" dirty="0" smtClean="0">
+              <a:rPr lang="en-US" sz="1600" dirty="0">
                 <a:solidFill>
                   <a:schemeClr val="accent2"/>
                 </a:solidFill>
@@ -6826,15 +7430,48 @@
               <a:t>Fingerprint</a:t>
             </a:r>
             <a:r>
+              <a:rPr lang="en-US" sz="1600" dirty="0"/>
+              <a:t>: collection of identified </a:t>
+            </a:r>
+            <a:r>
               <a:rPr lang="en-US" sz="1600" dirty="0" smtClean="0"/>
-              <a:t>: collection of features</a:t>
-            </a:r>
+              <a:t>features</a:t>
+            </a:r>
+            <a:endParaRPr lang="en-US" sz="1600" dirty="0" smtClean="0"/>
           </a:p>
           <a:p>
             <a:pPr lvl="1"/>
             <a:r>
               <a:rPr lang="en-US" sz="1600" dirty="0" smtClean="0"/>
-              <a:t>Fixed length byte array</a:t>
+              <a:t>Fixed </a:t>
+            </a:r>
+            <a:r>
+              <a:rPr lang="en-US" sz="1600" dirty="0" smtClean="0"/>
+              <a:t>list </a:t>
+            </a:r>
+            <a:r>
+              <a:rPr lang="en-US" sz="1600" dirty="0" smtClean="0"/>
+              <a:t>of 467 </a:t>
+            </a:r>
+            <a:r>
+              <a:rPr lang="en-US" sz="1600" dirty="0" smtClean="0"/>
+              <a:t>possible </a:t>
+            </a:r>
+            <a:r>
+              <a:rPr lang="en-US" sz="1600" dirty="0" smtClean="0"/>
+              <a:t>features</a:t>
+            </a:r>
+            <a:endParaRPr lang="en-US" sz="1600" dirty="0"/>
+          </a:p>
+          <a:p>
+            <a:pPr lvl="1"/>
+            <a:r>
+              <a:rPr lang="en-US" sz="1600" dirty="0" smtClean="0"/>
+              <a:t>Fixed </a:t>
+            </a:r>
+            <a:r>
+              <a:rPr lang="en-US" sz="1600" dirty="0" smtClean="0"/>
+              <a:t>length byte array</a:t>
             </a:r>
           </a:p>
           <a:p>
@@ -7181,4 +7818,265 @@
     </a:ext>
   </a:extLst>
 </a:theme>
+</file>
+
+<file path=ppt/theme/theme2.xml><?xml version="1.0" encoding="utf-8"?>
+<a:theme xmlns:a="http://schemas.openxmlformats.org/drawingml/2006/main" name="Office Theme">
+  <a:themeElements>
+    <a:clrScheme name="Office">
+      <a:dk1>
+        <a:sysClr val="windowText" lastClr="000000"/>
+      </a:dk1>
+      <a:lt1>
+        <a:sysClr val="window" lastClr="FFFFFF"/>
+      </a:lt1>
+      <a:dk2>
+        <a:srgbClr val="44546A"/>
+      </a:dk2>
+      <a:lt2>
+        <a:srgbClr val="E7E6E6"/>
+      </a:lt2>
+      <a:accent1>
+        <a:srgbClr val="5B9BD5"/>
+      </a:accent1>
+      <a:accent2>
+        <a:srgbClr val="ED7D31"/>
+      </a:accent2>
+      <a:accent3>
+        <a:srgbClr val="A5A5A5"/>
+      </a:accent3>
+      <a:accent4>
+        <a:srgbClr val="FFC000"/>
+      </a:accent4>
+      <a:accent5>
+        <a:srgbClr val="4472C4"/>
+      </a:accent5>
+      <a:accent6>
+        <a:srgbClr val="70AD47"/>
+      </a:accent6>
+      <a:hlink>
+        <a:srgbClr val="0563C1"/>
+      </a:hlink>
+      <a:folHlink>
+        <a:srgbClr val="954F72"/>
+      </a:folHlink>
+    </a:clrScheme>
+    <a:fontScheme name="Office">
+      <a:majorFont>
+        <a:latin typeface="Calibri Light" panose="020F0302020204030204"/>
+        <a:ea typeface=""/>
+        <a:cs typeface=""/>
+        <a:font script="Jpan" typeface="ＭＳ Ｐゴシック"/>
+        <a:font script="Hang" typeface="맑은 고딕"/>
+        <a:font script="Hans" typeface="宋体"/>
+        <a:font script="Hant" typeface="新細明體"/>
+        <a:font script="Arab" typeface="Times New Roman"/>
+        <a:font script="Hebr" typeface="Times New Roman"/>
+        <a:font script="Thai" typeface="Angsana New"/>
+        <a:font script="Ethi" typeface="Nyala"/>
+        <a:font script="Beng" typeface="Vrinda"/>
+        <a:font script="Gujr" typeface="Shruti"/>
+        <a:font script="Khmr" typeface="MoolBoran"/>
+        <a:font script="Knda" typeface="Tunga"/>
+        <a:font script="Guru" typeface="Raavi"/>
+        <a:font script="Cans" typeface="Euphemia"/>
+        <a:font script="Cher" typeface="Plantagenet Cherokee"/>
+        <a:font script="Yiii" typeface="Microsoft Yi Baiti"/>
+        <a:font script="Tibt" typeface="Microsoft Himalaya"/>
+        <a:font script="Thaa" typeface="MV Boli"/>
+        <a:font script="Deva" typeface="Mangal"/>
+        <a:font script="Telu" typeface="Gautami"/>
+        <a:font script="Taml" typeface="Latha"/>
+        <a:font script="Syrc" typeface="Estrangelo Edessa"/>
+        <a:font script="Orya" typeface="Kalinga"/>
+        <a:font script="Mlym" typeface="Kartika"/>
+        <a:font script="Laoo" typeface="DokChampa"/>
+        <a:font script="Sinh" typeface="Iskoola Pota"/>
+        <a:font script="Mong" typeface="Mongolian Baiti"/>
+        <a:font script="Viet" typeface="Times New Roman"/>
+        <a:font script="Uigh" typeface="Microsoft Uighur"/>
+        <a:font script="Geor" typeface="Sylfaen"/>
+      </a:majorFont>
+      <a:minorFont>
+        <a:latin typeface="Calibri" panose="020F0502020204030204"/>
+        <a:ea typeface=""/>
+        <a:cs typeface=""/>
+        <a:font script="Jpan" typeface="ＭＳ Ｐゴシック"/>
+        <a:font script="Hang" typeface="맑은 고딕"/>
+        <a:font script="Hans" typeface="宋体"/>
+        <a:font script="Hant" typeface="新細明體"/>
+        <a:font script="Arab" typeface="Arial"/>
+        <a:font script="Hebr" typeface="Arial"/>
+        <a:font script="Thai" typeface="Cordia New"/>
+        <a:font script="Ethi" typeface="Nyala"/>
+        <a:font script="Beng" typeface="Vrinda"/>
+        <a:font script="Gujr" typeface="Shruti"/>
+        <a:font script="Khmr" typeface="DaunPenh"/>
+        <a:font script="Knda" typeface="Tunga"/>
+        <a:font script="Guru" typeface="Raavi"/>
+        <a:font script="Cans" typeface="Euphemia"/>
+        <a:font script="Cher" typeface="Plantagenet Cherokee"/>
+        <a:font script="Yiii" typeface="Microsoft Yi Baiti"/>
+        <a:font script="Tibt" typeface="Microsoft Himalaya"/>
+        <a:font script="Thaa" typeface="MV Boli"/>
+        <a:font script="Deva" typeface="Mangal"/>
+        <a:font script="Telu" typeface="Gautami"/>
+        <a:font script="Taml" typeface="Latha"/>
+        <a:font script="Syrc" typeface="Estrangelo Edessa"/>
+        <a:font script="Orya" typeface="Kalinga"/>
+        <a:font script="Mlym" typeface="Kartika"/>
+        <a:font script="Laoo" typeface="DokChampa"/>
+        <a:font script="Sinh" typeface="Iskoola Pota"/>
+        <a:font script="Mong" typeface="Mongolian Baiti"/>
+        <a:font script="Viet" typeface="Arial"/>
+        <a:font script="Uigh" typeface="Microsoft Uighur"/>
+        <a:font script="Geor" typeface="Sylfaen"/>
+      </a:minorFont>
+    </a:fontScheme>
+    <a:fmtScheme name="Office">
+      <a:fillStyleLst>
+        <a:solidFill>
+          <a:schemeClr val="phClr"/>
+        </a:solidFill>
+        <a:gradFill rotWithShape="1">
+          <a:gsLst>
+            <a:gs pos="0">
+              <a:schemeClr val="phClr">
+                <a:lumMod val="110000"/>
+                <a:satMod val="105000"/>
+                <a:tint val="67000"/>
+              </a:schemeClr>
+            </a:gs>
+            <a:gs pos="50000">
+              <a:schemeClr val="phClr">
+                <a:lumMod val="105000"/>
+                <a:satMod val="103000"/>
+                <a:tint val="73000"/>
+              </a:schemeClr>
+            </a:gs>
+            <a:gs pos="100000">
+              <a:schemeClr val="phClr">
+                <a:lumMod val="105000"/>
+                <a:satMod val="109000"/>
+                <a:tint val="81000"/>
+              </a:schemeClr>
+            </a:gs>
+          </a:gsLst>
+          <a:lin ang="5400000" scaled="0"/>
+        </a:gradFill>
+        <a:gradFill rotWithShape="1">
+          <a:gsLst>
+            <a:gs pos="0">
+              <a:schemeClr val="phClr">
+                <a:satMod val="103000"/>
+                <a:lumMod val="102000"/>
+                <a:tint val="94000"/>
+              </a:schemeClr>
+            </a:gs>
+            <a:gs pos="50000">
+              <a:schemeClr val="phClr">
+                <a:satMod val="110000"/>
+                <a:lumMod val="100000"/>
+                <a:shade val="100000"/>
+              </a:schemeClr>
+            </a:gs>
+            <a:gs pos="100000">
+              <a:schemeClr val="phClr">
+                <a:lumMod val="99000"/>
+                <a:satMod val="120000"/>
+                <a:shade val="78000"/>
+              </a:schemeClr>
+            </a:gs>
+          </a:gsLst>
+          <a:lin ang="5400000" scaled="0"/>
+        </a:gradFill>
+      </a:fillStyleLst>
+      <a:lnStyleLst>
+        <a:ln w="6350" cap="flat" cmpd="sng" algn="ctr">
+          <a:solidFill>
+            <a:schemeClr val="phClr"/>
+          </a:solidFill>
+          <a:prstDash val="solid"/>
+          <a:miter lim="800000"/>
+        </a:ln>
+        <a:ln w="12700" cap="flat" cmpd="sng" algn="ctr">
+          <a:solidFill>
+            <a:schemeClr val="phClr"/>
+          </a:solidFill>
+          <a:prstDash val="solid"/>
+          <a:miter lim="800000"/>
+        </a:ln>
+        <a:ln w="19050" cap="flat" cmpd="sng" algn="ctr">
+          <a:solidFill>
+            <a:schemeClr val="phClr"/>
+          </a:solidFill>
+          <a:prstDash val="solid"/>
+          <a:miter lim="800000"/>
+        </a:ln>
+      </a:lnStyleLst>
+      <a:effectStyleLst>
+        <a:effectStyle>
+          <a:effectLst/>
+        </a:effectStyle>
+        <a:effectStyle>
+          <a:effectLst/>
+        </a:effectStyle>
+        <a:effectStyle>
+          <a:effectLst>
+            <a:outerShdw blurRad="57150" dist="19050" dir="5400000" algn="ctr" rotWithShape="0">
+              <a:srgbClr val="000000">
+                <a:alpha val="63000"/>
+              </a:srgbClr>
+            </a:outerShdw>
+          </a:effectLst>
+        </a:effectStyle>
+      </a:effectStyleLst>
+      <a:bgFillStyleLst>
+        <a:solidFill>
+          <a:schemeClr val="phClr"/>
+        </a:solidFill>
+        <a:solidFill>
+          <a:schemeClr val="phClr">
+            <a:tint val="95000"/>
+            <a:satMod val="170000"/>
+          </a:schemeClr>
+        </a:solidFill>
+        <a:gradFill rotWithShape="1">
+          <a:gsLst>
+            <a:gs pos="0">
+              <a:schemeClr val="phClr">
+                <a:tint val="93000"/>
+                <a:satMod val="150000"/>
+                <a:shade val="98000"/>
+                <a:lumMod val="102000"/>
+              </a:schemeClr>
+            </a:gs>
+            <a:gs pos="50000">
+              <a:schemeClr val="phClr">
+                <a:tint val="98000"/>
+                <a:satMod val="130000"/>
+                <a:shade val="90000"/>
+                <a:lumMod val="103000"/>
+              </a:schemeClr>
+            </a:gs>
+            <a:gs pos="100000">
+              <a:schemeClr val="phClr">
+                <a:shade val="63000"/>
+                <a:satMod val="120000"/>
+              </a:schemeClr>
+            </a:gs>
+          </a:gsLst>
+          <a:lin ang="5400000" scaled="0"/>
+        </a:gradFill>
+      </a:bgFillStyleLst>
+    </a:fmtScheme>
+  </a:themeElements>
+  <a:objectDefaults/>
+  <a:extraClrSchemeLst/>
+  <a:extLst>
+    <a:ext uri="{05A4C25C-085E-4340-85A3-A5531E510DB2}">
+      <thm15:themeFamily xmlns:thm15="http://schemas.microsoft.com/office/thememl/2012/main" name="Office Theme" id="{62F939B6-93AF-4DB8-9C6B-D6C7DFDC589F}" vid="{4A3C46E8-61CC-4603-A589-7422A47A8E4A}"/>
+    </a:ext>
+  </a:extLst>
+</a:theme>
 </file>
</xml_diff>